<commit_message>
ultimos cambios en clase
</commit_message>
<xml_diff>
--- a/FP Dual 1º 2019 - Desarrollar-modificar programas organizados en clases aplicando POO.pptx
+++ b/FP Dual 1º 2019 - Desarrollar-modificar programas organizados en clases aplicando POO.pptx
@@ -165,6 +165,18 @@
 </p:presentation>
 </file>
 
+<file path=ppt/commentAuthors.xml><?xml version="1.0" encoding="utf-8"?>
+<p:cmAuthorLst xmlns:a="http://schemas.openxmlformats.org/drawingml/2006/main" xmlns:r="http://schemas.openxmlformats.org/officeDocument/2006/relationships" xmlns:p="http://schemas.openxmlformats.org/presentationml/2006/main">
+  <p:cmAuthor id="1" name="JIMENEZ JURADO Miguel Jesus" initials="JJMJ" lastIdx="1" clrIdx="0">
+    <p:extLst>
+      <p:ext uri="{19B8F6BF-5375-455C-9EA6-DF929625EA0E}">
+        <p15:presenceInfo xmlns:p15="http://schemas.microsoft.com/office/powerpoint/2012/main" userId="JIMENEZ JURADO Miguel Jesus" providerId="None"/>
+      </p:ext>
+    </p:extLst>
+  </p:cmAuthor>
+</p:cmAuthorLst>
+</file>
+
 <file path=ppt/handoutMasters/handoutMaster1.xml><?xml version="1.0" encoding="utf-8"?>
 <p:handoutMaster xmlns:a="http://schemas.openxmlformats.org/drawingml/2006/main" xmlns:r="http://schemas.openxmlformats.org/officeDocument/2006/relationships" xmlns:p="http://schemas.openxmlformats.org/presentationml/2006/main">
   <p:cSld>
@@ -275,7 +287,7 @@
               <a:pPr>
                 <a:defRPr/>
               </a:pPr>
-              <a:t>29/03/2019</a:t>
+              <a:t>02/04/2019</a:t>
             </a:fld>
             <a:endParaRPr lang="fr-FR"/>
           </a:p>
@@ -494,7 +506,7 @@
               <a:pPr>
                 <a:defRPr/>
               </a:pPr>
-              <a:t>29/03/2019</a:t>
+              <a:t>02/04/2019</a:t>
             </a:fld>
             <a:endParaRPr lang="fr-FR"/>
           </a:p>
@@ -1296,7 +1308,7 @@
             </a:pPr>
             <a:fld id="{BEDFDCAD-79B2-49A7-84F3-F37C65B12F37}" type="datetime5">
               <a:rPr lang="es-ES_tradnl" smtClean="0"/>
-              <a:t>29-mar-19</a:t>
+              <a:t>2-abr-19</a:t>
             </a:fld>
             <a:endParaRPr lang="fr-FR" dirty="0"/>
           </a:p>
@@ -1760,7 +1772,7 @@
             </a:pPr>
             <a:fld id="{80E1E75F-ED9C-4FE6-86DE-12F9655AEE8B}" type="datetime5">
               <a:rPr lang="es-ES_tradnl" smtClean="0"/>
-              <a:t>29-mar-19</a:t>
+              <a:t>2-abr-19</a:t>
             </a:fld>
             <a:endParaRPr lang="fr-FR" dirty="0"/>
           </a:p>
@@ -2224,7 +2236,7 @@
             </a:pPr>
             <a:fld id="{281BB3E7-EC44-43C8-8B8A-51B979E508C1}" type="datetime5">
               <a:rPr lang="es-ES_tradnl" smtClean="0"/>
-              <a:t>29-mar-19</a:t>
+              <a:t>2-abr-19</a:t>
             </a:fld>
             <a:endParaRPr lang="fr-FR" dirty="0"/>
           </a:p>
@@ -2688,7 +2700,7 @@
             </a:pPr>
             <a:fld id="{338508A2-4220-4C7F-BF7F-DD6951355C08}" type="datetime5">
               <a:rPr lang="es-ES_tradnl" smtClean="0"/>
-              <a:t>29-mar-19</a:t>
+              <a:t>2-abr-19</a:t>
             </a:fld>
             <a:endParaRPr lang="fr-FR" dirty="0"/>
           </a:p>
@@ -3075,7 +3087,7 @@
             </a:pPr>
             <a:fld id="{E3F14906-748A-4C3C-983B-6C0032B77CBB}" type="datetime5">
               <a:rPr lang="es-ES_tradnl" smtClean="0"/>
-              <a:t>29-mar-19</a:t>
+              <a:t>2-abr-19</a:t>
             </a:fld>
             <a:endParaRPr lang="fr-FR" dirty="0"/>
           </a:p>
@@ -3462,7 +3474,7 @@
             </a:pPr>
             <a:fld id="{FF470809-F837-4114-AC36-66D05FDB75E8}" type="datetime5">
               <a:rPr lang="es-ES_tradnl" smtClean="0"/>
-              <a:t>29-mar-19</a:t>
+              <a:t>2-abr-19</a:t>
             </a:fld>
             <a:endParaRPr lang="fr-FR" dirty="0"/>
           </a:p>
@@ -3849,7 +3861,7 @@
             </a:pPr>
             <a:fld id="{ECD74885-AEAD-41CA-8F97-C7149C66D384}" type="datetime5">
               <a:rPr lang="es-ES_tradnl" smtClean="0"/>
-              <a:t>29-mar-19</a:t>
+              <a:t>2-abr-19</a:t>
             </a:fld>
             <a:endParaRPr lang="fr-FR" dirty="0"/>
           </a:p>
@@ -4236,7 +4248,7 @@
             </a:pPr>
             <a:fld id="{E2B6338C-15BE-454E-B45F-87ACF5B1F996}" type="datetime5">
               <a:rPr lang="es-ES_tradnl" smtClean="0"/>
-              <a:t>29-mar-19</a:t>
+              <a:t>2-abr-19</a:t>
             </a:fld>
             <a:endParaRPr lang="fr-FR" dirty="0"/>
           </a:p>
@@ -4771,7 +4783,7 @@
             </a:pPr>
             <a:fld id="{DA7CE4FC-10DA-40FB-88D5-0357CAC62C25}" type="datetime5">
               <a:rPr lang="es-ES_tradnl" smtClean="0"/>
-              <a:t>29-mar-19</a:t>
+              <a:t>2-abr-19</a:t>
             </a:fld>
             <a:endParaRPr lang="fr-FR" dirty="0"/>
           </a:p>
@@ -5309,7 +5321,7 @@
             </a:pPr>
             <a:fld id="{351A2961-124E-4830-8FB3-3FD19BD49CFD}" type="datetime5">
               <a:rPr lang="es-ES_tradnl" smtClean="0"/>
-              <a:t>29-mar-19</a:t>
+              <a:t>2-abr-19</a:t>
             </a:fld>
             <a:endParaRPr lang="fr-FR" dirty="0"/>
           </a:p>
@@ -5723,7 +5735,7 @@
             </a:pPr>
             <a:fld id="{EEEADD86-E0F4-498E-B6AE-9EB02D87BD87}" type="datetime5">
               <a:rPr lang="es-ES_tradnl" smtClean="0"/>
-              <a:t>29-mar-19</a:t>
+              <a:t>2-abr-19</a:t>
             </a:fld>
             <a:endParaRPr lang="fr-FR" dirty="0"/>
           </a:p>
@@ -6163,7 +6175,7 @@
             </a:pPr>
             <a:fld id="{6A0A7A46-7084-4936-AB65-1E4B7A3FEE0C}" type="datetime5">
               <a:rPr lang="es-ES_tradnl" smtClean="0"/>
-              <a:t>29-mar-19</a:t>
+              <a:t>2-abr-19</a:t>
             </a:fld>
             <a:endParaRPr lang="fr-FR" dirty="0"/>
           </a:p>
@@ -6701,7 +6713,7 @@
             </a:pPr>
             <a:fld id="{89913956-6B8C-4BFB-A34B-21CCFA50EC56}" type="datetime5">
               <a:rPr lang="es-ES_tradnl" smtClean="0"/>
-              <a:t>29-mar-19</a:t>
+              <a:t>2-abr-19</a:t>
             </a:fld>
             <a:endParaRPr lang="fr-FR" dirty="0"/>
           </a:p>
@@ -7410,7 +7422,7 @@
             </a:pPr>
             <a:fld id="{D1E630D5-8C5A-49CB-95C1-B2AEF7EBD1B8}" type="datetime5">
               <a:rPr lang="es-ES_tradnl" smtClean="0"/>
-              <a:t>29-mar-19</a:t>
+              <a:t>2-abr-19</a:t>
             </a:fld>
             <a:endParaRPr lang="fr-FR" dirty="0"/>
           </a:p>
@@ -7726,7 +7738,7 @@
             </a:pPr>
             <a:fld id="{6959F5A0-58A1-425A-AB29-D47619E0E183}" type="datetime5">
               <a:rPr lang="es-ES_tradnl" smtClean="0"/>
-              <a:t>29-mar-19</a:t>
+              <a:t>2-abr-19</a:t>
             </a:fld>
             <a:endParaRPr lang="fr-FR" dirty="0"/>
           </a:p>
@@ -8042,7 +8054,7 @@
             </a:pPr>
             <a:fld id="{D2EE8776-04CA-4692-853E-1A2A70628423}" type="datetime5">
               <a:rPr lang="es-ES_tradnl" smtClean="0"/>
-              <a:t>29-mar-19</a:t>
+              <a:t>2-abr-19</a:t>
             </a:fld>
             <a:endParaRPr lang="fr-FR" dirty="0"/>
           </a:p>
@@ -8298,7 +8310,7 @@
             </a:pPr>
             <a:fld id="{F363B1EB-31CC-4D4A-A0E0-9CD4E30593B2}" type="datetime5">
               <a:rPr lang="es-ES_tradnl" smtClean="0"/>
-              <a:t>29-mar-19</a:t>
+              <a:t>2-abr-19</a:t>
             </a:fld>
             <a:endParaRPr lang="fr-FR" dirty="0"/>
           </a:p>
@@ -8652,7 +8664,7 @@
             </a:pPr>
             <a:fld id="{127C1A29-7C20-4E45-81DC-625005270F0B}" type="datetime5">
               <a:rPr lang="es-ES_tradnl" smtClean="0"/>
-              <a:t>29-mar-19</a:t>
+              <a:t>2-abr-19</a:t>
             </a:fld>
             <a:endParaRPr lang="fr-FR" dirty="0"/>
           </a:p>
@@ -9006,7 +9018,7 @@
             </a:pPr>
             <a:fld id="{34973F92-AF15-4B60-95A5-2E81EA1D2C08}" type="datetime5">
               <a:rPr lang="es-ES_tradnl" smtClean="0"/>
-              <a:t>29-mar-19</a:t>
+              <a:t>2-abr-19</a:t>
             </a:fld>
             <a:endParaRPr lang="fr-FR" dirty="0"/>
           </a:p>
@@ -9360,7 +9372,7 @@
             </a:pPr>
             <a:fld id="{F5781FFE-52DC-450E-9971-7E37493042EA}" type="datetime5">
               <a:rPr lang="es-ES_tradnl" smtClean="0"/>
-              <a:t>29-mar-19</a:t>
+              <a:t>2-abr-19</a:t>
             </a:fld>
             <a:endParaRPr lang="fr-FR" dirty="0"/>
           </a:p>
@@ -9893,7 +9905,7 @@
             </a:pPr>
             <a:fld id="{ADBDC9D5-727D-495C-B956-8628EA6CD57F}" type="datetime5">
               <a:rPr lang="es-ES_tradnl" smtClean="0"/>
-              <a:t>29-mar-19</a:t>
+              <a:t>2-abr-19</a:t>
             </a:fld>
             <a:endParaRPr lang="fr-FR" dirty="0"/>
           </a:p>
@@ -10665,7 +10677,7 @@
             </a:pPr>
             <a:fld id="{EEEADD86-E0F4-498E-B6AE-9EB02D87BD87}" type="datetime5">
               <a:rPr lang="es-ES_tradnl" smtClean="0"/>
-              <a:t>29-mar-19</a:t>
+              <a:t>2-abr-19</a:t>
             </a:fld>
             <a:endParaRPr lang="fr-FR" dirty="0"/>
           </a:p>
@@ -11247,7 +11259,7 @@
             </a:pPr>
             <a:fld id="{BEDFDCAD-79B2-49A7-84F3-F37C65B12F37}" type="datetime5">
               <a:rPr lang="es-ES_tradnl" smtClean="0"/>
-              <a:t>29-mar-19</a:t>
+              <a:t>2-abr-19</a:t>
             </a:fld>
             <a:endParaRPr lang="fr-FR" dirty="0"/>
           </a:p>
@@ -11459,24 +11471,83 @@
               <a:rPr lang="es-ES" sz="1400" dirty="0"/>
               <a:t>	6.2. Implementación del servicio desacoplada de la implementación del repositorio.</a:t>
             </a:r>
+            <a:endParaRPr lang="es-ES" dirty="0"/>
           </a:p>
           <a:p>
             <a:pPr marL="0" indent="0">
               <a:buNone/>
             </a:pPr>
-            <a:endParaRPr lang="es-ES" dirty="0"/>
-          </a:p>
-          <a:p>
-            <a:pPr marL="0" indent="0">
+            <a:r>
+              <a:rPr lang="es-ES" dirty="0"/>
+              <a:t>8. 	Controlador API REST (consulta y eliminación de documentos).                                                                                                              </a:t>
+            </a:r>
+          </a:p>
+          <a:p>
+            <a:pPr marL="77787" lvl="1" indent="0">
               <a:buNone/>
             </a:pPr>
             <a:r>
-              <a:rPr lang="es-ES" dirty="0">
+              <a:rPr lang="es-ES" dirty="0"/>
+              <a:t>	</a:t>
+            </a:r>
+            <a:r>
+              <a:rPr lang="es-ES" sz="1400" dirty="0"/>
+              <a:t>7.1. Introducción servidor web y peticiones HTTP.</a:t>
+            </a:r>
+          </a:p>
+          <a:p>
+            <a:pPr marL="77787" lvl="1" indent="0">
+              <a:buNone/>
+            </a:pPr>
+            <a:r>
+              <a:rPr lang="es-ES" sz="1400" dirty="0"/>
+              <a:t>	7.2. Introducción patrón de diseño modelo / vista / controlador.</a:t>
+            </a:r>
+          </a:p>
+          <a:p>
+            <a:pPr marL="77787" lvl="1" indent="0">
+              <a:buNone/>
+            </a:pPr>
+            <a:r>
+              <a:rPr lang="es-ES" sz="1400" dirty="0"/>
+              <a:t>	7.3. </a:t>
+            </a:r>
+            <a:r>
+              <a:rPr lang="es-ES" sz="1400" dirty="0">
                 <a:hlinkClick r:id="rId2"/>
               </a:rPr>
-              <a:t>https://bbvaopen4u.com/es/actualidad/api-rest-que-es-y-cuales-son-sus-ventajas-en-el-desarrollo-de-proyectos</a:t>
-            </a:r>
-            <a:endParaRPr lang="es-ES" dirty="0"/>
+              <a:t>Introducción API REST</a:t>
+            </a:r>
+            <a:r>
+              <a:rPr lang="es-ES" sz="1400" dirty="0"/>
+              <a:t>.</a:t>
+            </a:r>
+          </a:p>
+          <a:p>
+            <a:pPr marL="77787" lvl="1" indent="0">
+              <a:buNone/>
+            </a:pPr>
+            <a:r>
+              <a:rPr lang="es-ES" sz="1400" dirty="0"/>
+              <a:t>	7.4. Implementación controlador para explotación de los servicios de consulta y eliminación implementados en el punto 6.</a:t>
+            </a:r>
+          </a:p>
+          <a:p>
+            <a:pPr marL="77787" lvl="1" indent="0">
+              <a:buNone/>
+            </a:pPr>
+            <a:r>
+              <a:rPr lang="es-ES" sz="1400" dirty="0"/>
+              <a:t>	7.5. </a:t>
+            </a:r>
+            <a:r>
+              <a:rPr lang="es-ES" sz="1400" dirty="0" err="1"/>
+              <a:t>Postman</a:t>
+            </a:r>
+            <a:r>
+              <a:rPr lang="es-ES" sz="1400" dirty="0"/>
+              <a:t>: prueba de controlador.</a:t>
+            </a:r>
           </a:p>
         </p:txBody>
       </p:sp>
@@ -11490,7 +11561,12 @@
             <p:ph type="dt" sz="half" idx="10"/>
           </p:nvPr>
         </p:nvSpPr>
-        <p:spPr/>
+        <p:spPr>
+          <a:xfrm>
+            <a:off x="1945640" y="6675437"/>
+            <a:ext cx="982663" cy="365125"/>
+          </a:xfrm>
+        </p:spPr>
         <p:txBody>
           <a:bodyPr/>
           <a:lstStyle/>
@@ -11500,7 +11576,7 @@
             </a:pPr>
             <a:fld id="{BEDFDCAD-79B2-49A7-84F3-F37C65B12F37}" type="datetime5">
               <a:rPr lang="es-ES_tradnl" smtClean="0"/>
-              <a:t>29-mar-19</a:t>
+              <a:t>2-abr-19</a:t>
             </a:fld>
             <a:endParaRPr lang="fr-FR" dirty="0"/>
           </a:p>

</xml_diff>